<commit_message>
ultimas alteracoes nos jupyter notebooks
</commit_message>
<xml_diff>
--- a/Case_ML.pptx
+++ b/Case_ML.pptx
@@ -2836,7 +2836,7 @@
           <a:p>
             <a:fld id="{35C2BCD4-59AE-0345-9D20-CA0C8F548AC1}" type="datetimeFigureOut">
               <a:rPr lang="pt-BR" smtClean="0"/>
-              <a:t>14/08/2025</a:t>
+              <a:t>15/08/2025</a:t>
             </a:fld>
             <a:endParaRPr lang="pt-BR"/>
           </a:p>
@@ -3572,7 +3572,7 @@
           <a:p>
             <a:fld id="{16BA892D-B2EC-0040-A8C3-D8B8197BD475}" type="datetimeFigureOut">
               <a:rPr lang="pt-BR" smtClean="0"/>
-              <a:t>14/08/2025</a:t>
+              <a:t>15/08/2025</a:t>
             </a:fld>
             <a:endParaRPr lang="pt-BR"/>
           </a:p>
@@ -3770,7 +3770,7 @@
           <a:p>
             <a:fld id="{16BA892D-B2EC-0040-A8C3-D8B8197BD475}" type="datetimeFigureOut">
               <a:rPr lang="pt-BR" smtClean="0"/>
-              <a:t>14/08/2025</a:t>
+              <a:t>15/08/2025</a:t>
             </a:fld>
             <a:endParaRPr lang="pt-BR"/>
           </a:p>
@@ -3978,7 +3978,7 @@
           <a:p>
             <a:fld id="{16BA892D-B2EC-0040-A8C3-D8B8197BD475}" type="datetimeFigureOut">
               <a:rPr lang="pt-BR" smtClean="0"/>
-              <a:t>14/08/2025</a:t>
+              <a:t>15/08/2025</a:t>
             </a:fld>
             <a:endParaRPr lang="pt-BR"/>
           </a:p>
@@ -4176,7 +4176,7 @@
           <a:p>
             <a:fld id="{16BA892D-B2EC-0040-A8C3-D8B8197BD475}" type="datetimeFigureOut">
               <a:rPr lang="pt-BR" smtClean="0"/>
-              <a:t>14/08/2025</a:t>
+              <a:t>15/08/2025</a:t>
             </a:fld>
             <a:endParaRPr lang="pt-BR"/>
           </a:p>
@@ -4451,7 +4451,7 @@
           <a:p>
             <a:fld id="{16BA892D-B2EC-0040-A8C3-D8B8197BD475}" type="datetimeFigureOut">
               <a:rPr lang="pt-BR" smtClean="0"/>
-              <a:t>14/08/2025</a:t>
+              <a:t>15/08/2025</a:t>
             </a:fld>
             <a:endParaRPr lang="pt-BR"/>
           </a:p>
@@ -4716,7 +4716,7 @@
           <a:p>
             <a:fld id="{16BA892D-B2EC-0040-A8C3-D8B8197BD475}" type="datetimeFigureOut">
               <a:rPr lang="pt-BR" smtClean="0"/>
-              <a:t>14/08/2025</a:t>
+              <a:t>15/08/2025</a:t>
             </a:fld>
             <a:endParaRPr lang="pt-BR"/>
           </a:p>
@@ -5128,7 +5128,7 @@
           <a:p>
             <a:fld id="{16BA892D-B2EC-0040-A8C3-D8B8197BD475}" type="datetimeFigureOut">
               <a:rPr lang="pt-BR" smtClean="0"/>
-              <a:t>14/08/2025</a:t>
+              <a:t>15/08/2025</a:t>
             </a:fld>
             <a:endParaRPr lang="pt-BR"/>
           </a:p>
@@ -5269,7 +5269,7 @@
           <a:p>
             <a:fld id="{16BA892D-B2EC-0040-A8C3-D8B8197BD475}" type="datetimeFigureOut">
               <a:rPr lang="pt-BR" smtClean="0"/>
-              <a:t>14/08/2025</a:t>
+              <a:t>15/08/2025</a:t>
             </a:fld>
             <a:endParaRPr lang="pt-BR"/>
           </a:p>
@@ -5382,7 +5382,7 @@
           <a:p>
             <a:fld id="{16BA892D-B2EC-0040-A8C3-D8B8197BD475}" type="datetimeFigureOut">
               <a:rPr lang="pt-BR" smtClean="0"/>
-              <a:t>14/08/2025</a:t>
+              <a:t>15/08/2025</a:t>
             </a:fld>
             <a:endParaRPr lang="pt-BR"/>
           </a:p>
@@ -5693,7 +5693,7 @@
           <a:p>
             <a:fld id="{16BA892D-B2EC-0040-A8C3-D8B8197BD475}" type="datetimeFigureOut">
               <a:rPr lang="pt-BR" smtClean="0"/>
-              <a:t>14/08/2025</a:t>
+              <a:t>15/08/2025</a:t>
             </a:fld>
             <a:endParaRPr lang="pt-BR"/>
           </a:p>
@@ -5981,7 +5981,7 @@
           <a:p>
             <a:fld id="{16BA892D-B2EC-0040-A8C3-D8B8197BD475}" type="datetimeFigureOut">
               <a:rPr lang="pt-BR" smtClean="0"/>
-              <a:t>14/08/2025</a:t>
+              <a:t>15/08/2025</a:t>
             </a:fld>
             <a:endParaRPr lang="pt-BR"/>
           </a:p>
@@ -6222,7 +6222,7 @@
           <a:p>
             <a:fld id="{16BA892D-B2EC-0040-A8C3-D8B8197BD475}" type="datetimeFigureOut">
               <a:rPr lang="pt-BR" smtClean="0"/>
-              <a:t>14/08/2025</a:t>
+              <a:t>15/08/2025</a:t>
             </a:fld>
             <a:endParaRPr lang="pt-BR"/>
           </a:p>
@@ -10416,7 +10416,7 @@
         </p:nvSpPr>
         <p:spPr>
           <a:xfrm>
-            <a:off x="972459" y="183440"/>
+            <a:off x="957945" y="317499"/>
             <a:ext cx="8708569" cy="761604"/>
           </a:xfrm>
           <a:prstGeom prst="rect">

</xml_diff>